<commit_message>
Live Demo link added
</commit_message>
<xml_diff>
--- a/CC_Project_Demo_Medha.pptx
+++ b/CC_Project_Demo_Medha.pptx
@@ -142,12 +142,37 @@
 <p1510:revInfo xmlns:a="http://schemas.openxmlformats.org/drawingml/2006/main" xmlns:r="http://schemas.openxmlformats.org/officeDocument/2006/relationships" xmlns:p1510="http://schemas.microsoft.com/office/powerpoint/2015/10/main">
   <p1510:revLst>
     <p1510:client id="{65F0F3DF-F028-1342-AA66-9011544BDF01}" v="248" dt="2025-04-17T14:09:18.097"/>
+    <p1510:client id="{C3C3CC87-ADB3-4144-A8A3-BC1CD21EBD8D}" v="2" dt="2025-04-17T17:51:55.452"/>
   </p1510:revLst>
 </p1510:revInfo>
 </file>
 
 <file path=ppt/changesInfos/changesInfo1.xml><?xml version="1.0" encoding="utf-8"?>
 <pc:chgInfo xmlns:a="http://schemas.openxmlformats.org/drawingml/2006/main" xmlns:r="http://schemas.openxmlformats.org/officeDocument/2006/relationships" xmlns:ac="http://schemas.microsoft.com/office/drawing/2013/main/command" xmlns:pc="http://schemas.microsoft.com/office/powerpoint/2013/main/command">
+  <pc:docChgLst>
+    <pc:chgData name="Medha Sakhamuri" userId="3558979d-df9a-492b-a02b-f7658854ec17" providerId="ADAL" clId="{C3C3CC87-ADB3-4144-A8A3-BC1CD21EBD8D}"/>
+    <pc:docChg chg="modSld">
+      <pc:chgData name="Medha Sakhamuri" userId="3558979d-df9a-492b-a02b-f7658854ec17" providerId="ADAL" clId="{C3C3CC87-ADB3-4144-A8A3-BC1CD21EBD8D}" dt="2025-04-17T17:52:29.511" v="28" actId="113"/>
+      <pc:docMkLst>
+        <pc:docMk/>
+      </pc:docMkLst>
+      <pc:sldChg chg="addSp modSp mod">
+        <pc:chgData name="Medha Sakhamuri" userId="3558979d-df9a-492b-a02b-f7658854ec17" providerId="ADAL" clId="{C3C3CC87-ADB3-4144-A8A3-BC1CD21EBD8D}" dt="2025-04-17T17:52:29.511" v="28" actId="113"/>
+        <pc:sldMkLst>
+          <pc:docMk/>
+          <pc:sldMk cId="4288587416" sldId="275"/>
+        </pc:sldMkLst>
+        <pc:spChg chg="add mod">
+          <ac:chgData name="Medha Sakhamuri" userId="3558979d-df9a-492b-a02b-f7658854ec17" providerId="ADAL" clId="{C3C3CC87-ADB3-4144-A8A3-BC1CD21EBD8D}" dt="2025-04-17T17:52:29.511" v="28" actId="113"/>
+          <ac:spMkLst>
+            <pc:docMk/>
+            <pc:sldMk cId="4288587416" sldId="275"/>
+            <ac:spMk id="7" creationId="{8A021881-6290-E45C-3767-5881D4BD6658}"/>
+          </ac:spMkLst>
+        </pc:spChg>
+      </pc:sldChg>
+    </pc:docChg>
+  </pc:docChgLst>
   <pc:docChgLst>
     <pc:chgData name="Medha Sakhamuri" userId="3558979d-df9a-492b-a02b-f7658854ec17" providerId="ADAL" clId="{65F0F3DF-F028-1342-AA66-9011544BDF01}"/>
     <pc:docChg chg="undo custSel addSld delSld modSld sldOrd">
@@ -20774,6 +20799,56 @@
           </a:extLst>
         </p:spPr>
       </p:pic>
+      <p:sp>
+        <p:nvSpPr>
+          <p:cNvPr id="7" name="TextBox 6">
+            <a:extLst>
+              <a:ext uri="{FF2B5EF4-FFF2-40B4-BE49-F238E27FC236}">
+                <a16:creationId xmlns:a16="http://schemas.microsoft.com/office/drawing/2014/main" id="{8A021881-6290-E45C-3767-5881D4BD6658}"/>
+              </a:ext>
+            </a:extLst>
+          </p:cNvPr>
+          <p:cNvSpPr txBox="1"/>
+          <p:nvPr/>
+        </p:nvSpPr>
+        <p:spPr>
+          <a:xfrm>
+            <a:off x="1357736" y="6355078"/>
+            <a:ext cx="6114624" cy="369332"/>
+          </a:xfrm>
+          <a:prstGeom prst="rect">
+            <a:avLst/>
+          </a:prstGeom>
+          <a:noFill/>
+        </p:spPr>
+        <p:txBody>
+          <a:bodyPr wrap="none" rtlCol="0">
+            <a:spAutoFit/>
+          </a:bodyPr>
+          <a:lstStyle/>
+          <a:p>
+            <a:pPr algn="ctr"/>
+            <a:r>
+              <a:rPr lang="en-US" b="1" dirty="0"/>
+              <a:t>Live DEMO Link</a:t>
+            </a:r>
+            <a:r>
+              <a:rPr lang="en-US" dirty="0"/>
+              <a:t>: </a:t>
+            </a:r>
+            <a:r>
+              <a:rPr lang="en-US" dirty="0">
+                <a:hlinkClick r:id="rId4"/>
+              </a:rPr>
+              <a:t>https://youtu.be/OkruHlKifrg?feature=shared</a:t>
+            </a:r>
+            <a:r>
+              <a:rPr lang="en-US" dirty="0"/>
+              <a:t> </a:t>
+            </a:r>
+          </a:p>
+        </p:txBody>
+      </p:sp>
     </p:spTree>
     <p:extLst>
       <p:ext uri="{BB962C8B-B14F-4D97-AF65-F5344CB8AC3E}">

</xml_diff>